<commit_message>
Correct date in the documents' agenda slides; Added agenda for ann arbor.
</commit_message>
<xml_diff>
--- a/2025_SMDM/01_DES.pptx
+++ b/2025_SMDM/01_DES.pptx
@@ -885,7 +885,7 @@
           <a:p>
             <a:fld id="{E033252C-ECEF-0044-BF19-FBFB46CE84A2}" type="datetimeFigureOut">
               <a:rPr lang="en-US" smtClean="0"/>
-              <a:t>10/31/24</a:t>
+              <a:t>6/12/25</a:t>
             </a:fld>
             <a:endParaRPr lang="en-US"/>
           </a:p>
@@ -2157,7 +2157,7 @@
           <a:p>
             <a:fld id="{6A8FB48A-BFC4-2846-8228-6201ABA4D0C5}" type="datetimeFigureOut">
               <a:rPr lang="en-US" smtClean="0"/>
-              <a:t>10/31/24</a:t>
+              <a:t>6/12/25</a:t>
             </a:fld>
             <a:endParaRPr lang="en-US"/>
           </a:p>
@@ -2355,7 +2355,7 @@
           <a:p>
             <a:fld id="{6A8FB48A-BFC4-2846-8228-6201ABA4D0C5}" type="datetimeFigureOut">
               <a:rPr lang="en-US" smtClean="0"/>
-              <a:t>10/31/24</a:t>
+              <a:t>6/12/25</a:t>
             </a:fld>
             <a:endParaRPr lang="en-US"/>
           </a:p>
@@ -2563,7 +2563,7 @@
           <a:p>
             <a:fld id="{6A8FB48A-BFC4-2846-8228-6201ABA4D0C5}" type="datetimeFigureOut">
               <a:rPr lang="en-US" smtClean="0"/>
-              <a:t>10/31/24</a:t>
+              <a:t>6/12/25</a:t>
             </a:fld>
             <a:endParaRPr lang="en-US"/>
           </a:p>
@@ -2761,7 +2761,7 @@
           <a:p>
             <a:fld id="{6A8FB48A-BFC4-2846-8228-6201ABA4D0C5}" type="datetimeFigureOut">
               <a:rPr lang="en-US" smtClean="0"/>
-              <a:t>10/31/24</a:t>
+              <a:t>6/12/25</a:t>
             </a:fld>
             <a:endParaRPr lang="en-US"/>
           </a:p>
@@ -3036,7 +3036,7 @@
           <a:p>
             <a:fld id="{6A8FB48A-BFC4-2846-8228-6201ABA4D0C5}" type="datetimeFigureOut">
               <a:rPr lang="en-US" smtClean="0"/>
-              <a:t>10/31/24</a:t>
+              <a:t>6/12/25</a:t>
             </a:fld>
             <a:endParaRPr lang="en-US"/>
           </a:p>
@@ -3301,7 +3301,7 @@
           <a:p>
             <a:fld id="{6A8FB48A-BFC4-2846-8228-6201ABA4D0C5}" type="datetimeFigureOut">
               <a:rPr lang="en-US" smtClean="0"/>
-              <a:t>10/31/24</a:t>
+              <a:t>6/12/25</a:t>
             </a:fld>
             <a:endParaRPr lang="en-US"/>
           </a:p>
@@ -3713,7 +3713,7 @@
           <a:p>
             <a:fld id="{6A8FB48A-BFC4-2846-8228-6201ABA4D0C5}" type="datetimeFigureOut">
               <a:rPr lang="en-US" smtClean="0"/>
-              <a:t>10/31/24</a:t>
+              <a:t>6/12/25</a:t>
             </a:fld>
             <a:endParaRPr lang="en-US"/>
           </a:p>
@@ -3854,7 +3854,7 @@
           <a:p>
             <a:fld id="{6A8FB48A-BFC4-2846-8228-6201ABA4D0C5}" type="datetimeFigureOut">
               <a:rPr lang="en-US" smtClean="0"/>
-              <a:t>10/31/24</a:t>
+              <a:t>6/12/25</a:t>
             </a:fld>
             <a:endParaRPr lang="en-US"/>
           </a:p>
@@ -3967,7 +3967,7 @@
           <a:p>
             <a:fld id="{6A8FB48A-BFC4-2846-8228-6201ABA4D0C5}" type="datetimeFigureOut">
               <a:rPr lang="en-US" smtClean="0"/>
-              <a:t>10/31/24</a:t>
+              <a:t>6/12/25</a:t>
             </a:fld>
             <a:endParaRPr lang="en-US"/>
           </a:p>
@@ -4278,7 +4278,7 @@
           <a:p>
             <a:fld id="{6A8FB48A-BFC4-2846-8228-6201ABA4D0C5}" type="datetimeFigureOut">
               <a:rPr lang="en-US" smtClean="0"/>
-              <a:t>10/31/24</a:t>
+              <a:t>6/12/25</a:t>
             </a:fld>
             <a:endParaRPr lang="en-US"/>
           </a:p>
@@ -4566,7 +4566,7 @@
           <a:p>
             <a:fld id="{6A8FB48A-BFC4-2846-8228-6201ABA4D0C5}" type="datetimeFigureOut">
               <a:rPr lang="en-US" smtClean="0"/>
-              <a:t>10/31/24</a:t>
+              <a:t>6/12/25</a:t>
             </a:fld>
             <a:endParaRPr lang="en-US"/>
           </a:p>
@@ -4807,7 +4807,7 @@
           <a:p>
             <a:fld id="{6A8FB48A-BFC4-2846-8228-6201ABA4D0C5}" type="datetimeFigureOut">
               <a:rPr lang="en-US" smtClean="0"/>
-              <a:t>10/31/24</a:t>
+              <a:t>6/12/25</a:t>
             </a:fld>
             <a:endParaRPr lang="en-US"/>
           </a:p>
@@ -5242,7 +5242,7 @@
         </p:nvGraphicFramePr>
         <p:xfrm>
           <a:off x="1208690" y="942340"/>
-          <a:ext cx="10720551" cy="4699000"/>
+          <a:ext cx="10720551" cy="4973320"/>
         </p:xfrm>
         <a:graphic>
           <a:graphicData uri="http://schemas.openxmlformats.org/drawingml/2006/table">
@@ -5941,10 +5941,10 @@
       </p:sp>
       <p:sp>
         <p:nvSpPr>
-          <p:cNvPr id="2" name="TextBox 1">
-            <a:extLst>
-              <a:ext uri="{FF2B5EF4-FFF2-40B4-BE49-F238E27FC236}">
-                <a16:creationId xmlns:a16="http://schemas.microsoft.com/office/drawing/2014/main" id="{B04BFB9E-F1AF-C1B9-A793-D2B5AAF73689}"/>
+          <p:cNvPr id="3" name="TextBox 2">
+            <a:extLst>
+              <a:ext uri="{FF2B5EF4-FFF2-40B4-BE49-F238E27FC236}">
+                <a16:creationId xmlns:a16="http://schemas.microsoft.com/office/drawing/2014/main" id="{7EE51BCC-7260-2CFE-255C-A46100C3F7DF}"/>
               </a:ext>
             </a:extLst>
           </p:cNvPr>
@@ -5954,7 +5954,7 @@
         <p:spPr>
           <a:xfrm>
             <a:off x="1208690" y="310250"/>
-            <a:ext cx="5017656" cy="461665"/>
+            <a:ext cx="4609082" cy="461665"/>
           </a:xfrm>
           <a:prstGeom prst="rect">
             <a:avLst/>
@@ -5969,7 +5969,7 @@
           <a:p>
             <a:r>
               <a:rPr lang="en-US" sz="2400" dirty="0"/>
-              <a:t>Sunday 27</a:t>
+              <a:t>Sunday 15</a:t>
             </a:r>
             <a:r>
               <a:rPr lang="en-US" sz="2400" baseline="30000" dirty="0"/>
@@ -5977,7 +5977,7 @@
             </a:r>
             <a:r>
               <a:rPr lang="en-US" sz="2400" dirty="0"/>
-              <a:t> of October 8:30 to 12:00</a:t>
+              <a:t> of June, 9:00 to 12:30</a:t>
             </a:r>
           </a:p>
         </p:txBody>
@@ -13234,7 +13234,7 @@
         </p:nvGraphicFramePr>
         <p:xfrm>
           <a:off x="1208690" y="942340"/>
-          <a:ext cx="10720551" cy="4699000"/>
+          <a:ext cx="10720551" cy="4973320"/>
         </p:xfrm>
         <a:graphic>
           <a:graphicData uri="http://schemas.openxmlformats.org/drawingml/2006/table">
@@ -13933,10 +13933,10 @@
       </p:sp>
       <p:sp>
         <p:nvSpPr>
-          <p:cNvPr id="2" name="TextBox 1">
-            <a:extLst>
-              <a:ext uri="{FF2B5EF4-FFF2-40B4-BE49-F238E27FC236}">
-                <a16:creationId xmlns:a16="http://schemas.microsoft.com/office/drawing/2014/main" id="{696FB621-0F70-DF5F-7F7A-719FEC9269B6}"/>
+          <p:cNvPr id="3" name="TextBox 2">
+            <a:extLst>
+              <a:ext uri="{FF2B5EF4-FFF2-40B4-BE49-F238E27FC236}">
+                <a16:creationId xmlns:a16="http://schemas.microsoft.com/office/drawing/2014/main" id="{C75F0199-9228-CF3C-15C7-E631CC1A4978}"/>
               </a:ext>
             </a:extLst>
           </p:cNvPr>
@@ -13946,7 +13946,7 @@
         <p:spPr>
           <a:xfrm>
             <a:off x="1208690" y="310250"/>
-            <a:ext cx="5017656" cy="461665"/>
+            <a:ext cx="4609082" cy="461665"/>
           </a:xfrm>
           <a:prstGeom prst="rect">
             <a:avLst/>
@@ -13961,7 +13961,7 @@
           <a:p>
             <a:r>
               <a:rPr lang="en-US" sz="2400" dirty="0"/>
-              <a:t>Sunday 27</a:t>
+              <a:t>Sunday 15</a:t>
             </a:r>
             <a:r>
               <a:rPr lang="en-US" sz="2400" baseline="30000" dirty="0"/>
@@ -13969,7 +13969,7 @@
             </a:r>
             <a:r>
               <a:rPr lang="en-US" sz="2400" dirty="0"/>
-              <a:t> of October 8:30 to 12:00</a:t>
+              <a:t> of June, 9:00 to 12:30</a:t>
             </a:r>
           </a:p>
         </p:txBody>
@@ -21005,17 +21005,6 @@
 </file>
 
 <file path=customXml/item2.xml><?xml version="1.0" encoding="utf-8"?>
-<p:properties xmlns:p="http://schemas.microsoft.com/office/2006/metadata/properties" xmlns:xsi="http://www.w3.org/2001/XMLSchema-instance" xmlns:pc="http://schemas.microsoft.com/office/infopath/2007/PartnerControls">
-  <documentManagement>
-    <TaxCatchAll xmlns="b6c9d19c-b34a-4cf4-8ebf-64c63fc48083" xsi:nil="true"/>
-    <lcf76f155ced4ddcb4097134ff3c332f xmlns="33f92c16-e346-46b5-ac57-2b519ac4cf68">
-      <Terms xmlns="http://schemas.microsoft.com/office/infopath/2007/PartnerControls"/>
-    </lcf76f155ced4ddcb4097134ff3c332f>
-  </documentManagement>
-</p:properties>
-</file>
-
-<file path=customXml/item3.xml><?xml version="1.0" encoding="utf-8"?>
 <ct:contentTypeSchema xmlns:ct="http://schemas.microsoft.com/office/2006/metadata/contentType" xmlns:ma="http://schemas.microsoft.com/office/2006/metadata/properties/metaAttributes" ct:_="" ma:_="" ma:contentTypeName="Document" ma:contentTypeID="0x0101007069032936BB004A979B3FCE77DE1EB1" ma:contentTypeVersion="16" ma:contentTypeDescription="Create a new document." ma:contentTypeScope="" ma:versionID="59b39aa881a230c9f06045ed60478b88">
   <xsd:schema xmlns:xsd="http://www.w3.org/2001/XMLSchema" xmlns:xs="http://www.w3.org/2001/XMLSchema" xmlns:p="http://schemas.microsoft.com/office/2006/metadata/properties" xmlns:ns2="33f92c16-e346-46b5-ac57-2b519ac4cf68" xmlns:ns3="0efde304-9646-43d8-8eee-5b1a55ab17f1" xmlns:ns4="b6c9d19c-b34a-4cf4-8ebf-64c63fc48083" targetNamespace="http://schemas.microsoft.com/office/2006/metadata/properties" ma:root="true" ma:fieldsID="c596c03b60b8e16cee14ab235af6374a" ns2:_="" ns3:_="" ns4:_="">
     <xsd:import namespace="33f92c16-e346-46b5-ac57-2b519ac4cf68"/>
@@ -21255,6 +21244,17 @@
 </ct:contentTypeSchema>
 </file>
 
+<file path=customXml/item3.xml><?xml version="1.0" encoding="utf-8"?>
+<p:properties xmlns:p="http://schemas.microsoft.com/office/2006/metadata/properties" xmlns:xsi="http://www.w3.org/2001/XMLSchema-instance" xmlns:pc="http://schemas.microsoft.com/office/infopath/2007/PartnerControls">
+  <documentManagement>
+    <TaxCatchAll xmlns="b6c9d19c-b34a-4cf4-8ebf-64c63fc48083" xsi:nil="true"/>
+    <lcf76f155ced4ddcb4097134ff3c332f xmlns="33f92c16-e346-46b5-ac57-2b519ac4cf68">
+      <Terms xmlns="http://schemas.microsoft.com/office/infopath/2007/PartnerControls"/>
+    </lcf76f155ced4ddcb4097134ff3c332f>
+  </documentManagement>
+</p:properties>
+</file>
+
 <file path=customXml/itemProps1.xml><?xml version="1.0" encoding="utf-8"?>
 <ds:datastoreItem xmlns:ds="http://schemas.openxmlformats.org/officeDocument/2006/customXml" ds:itemID="{EF0BFC65-ABD5-40EA-BAE0-821B9D6524E8}">
   <ds:schemaRefs>
@@ -21264,24 +21264,6 @@
 </file>
 
 <file path=customXml/itemProps2.xml><?xml version="1.0" encoding="utf-8"?>
-<ds:datastoreItem xmlns:ds="http://schemas.openxmlformats.org/officeDocument/2006/customXml" ds:itemID="{E709C047-1DE0-4980-A90A-4D5EFC165D2C}">
-  <ds:schemaRefs>
-    <ds:schemaRef ds:uri="http://schemas.microsoft.com/office/2006/documentManagement/types"/>
-    <ds:schemaRef ds:uri="0efde304-9646-43d8-8eee-5b1a55ab17f1"/>
-    <ds:schemaRef ds:uri="33f92c16-e346-46b5-ac57-2b519ac4cf68"/>
-    <ds:schemaRef ds:uri="http://purl.org/dc/elements/1.1/"/>
-    <ds:schemaRef ds:uri="http://schemas.microsoft.com/office/infopath/2007/PartnerControls"/>
-    <ds:schemaRef ds:uri="http://schemas.openxmlformats.org/package/2006/metadata/core-properties"/>
-    <ds:schemaRef ds:uri="http://purl.org/dc/terms/"/>
-    <ds:schemaRef ds:uri="http://schemas.microsoft.com/office/2006/metadata/properties"/>
-    <ds:schemaRef ds:uri="b6c9d19c-b34a-4cf4-8ebf-64c63fc48083"/>
-    <ds:schemaRef ds:uri="http://www.w3.org/XML/1998/namespace"/>
-    <ds:schemaRef ds:uri="http://purl.org/dc/dcmitype/"/>
-  </ds:schemaRefs>
-</ds:datastoreItem>
-</file>
-
-<file path=customXml/itemProps3.xml><?xml version="1.0" encoding="utf-8"?>
 <ds:datastoreItem xmlns:ds="http://schemas.openxmlformats.org/officeDocument/2006/customXml" ds:itemID="{2D7DA705-6300-4113-B183-485198D9C84E}">
   <ds:schemaRefs>
     <ds:schemaRef ds:uri="0efde304-9646-43d8-8eee-5b1a55ab17f1"/>
@@ -21299,4 +21281,22 @@
     <ds:schemaRef ds:uri="http://www.w3.org/2001/XMLSchema"/>
   </ds:schemaRefs>
 </ds:datastoreItem>
+</file>
+
+<file path=customXml/itemProps3.xml><?xml version="1.0" encoding="utf-8"?>
+<ds:datastoreItem xmlns:ds="http://schemas.openxmlformats.org/officeDocument/2006/customXml" ds:itemID="{E709C047-1DE0-4980-A90A-4D5EFC165D2C}">
+  <ds:schemaRefs>
+    <ds:schemaRef ds:uri="http://schemas.microsoft.com/office/2006/documentManagement/types"/>
+    <ds:schemaRef ds:uri="0efde304-9646-43d8-8eee-5b1a55ab17f1"/>
+    <ds:schemaRef ds:uri="33f92c16-e346-46b5-ac57-2b519ac4cf68"/>
+    <ds:schemaRef ds:uri="http://purl.org/dc/elements/1.1/"/>
+    <ds:schemaRef ds:uri="http://schemas.microsoft.com/office/infopath/2007/PartnerControls"/>
+    <ds:schemaRef ds:uri="http://schemas.openxmlformats.org/package/2006/metadata/core-properties"/>
+    <ds:schemaRef ds:uri="http://purl.org/dc/terms/"/>
+    <ds:schemaRef ds:uri="http://schemas.microsoft.com/office/2006/metadata/properties"/>
+    <ds:schemaRef ds:uri="b6c9d19c-b34a-4cf4-8ebf-64c63fc48083"/>
+    <ds:schemaRef ds:uri="http://www.w3.org/XML/1998/namespace"/>
+    <ds:schemaRef ds:uri="http://purl.org/dc/dcmitype/"/>
+  </ds:schemaRefs>
+</ds:datastoreItem>
 </file>
</xml_diff>